<commit_message>
[ BootcampComercial ] - teoria
</commit_message>
<xml_diff>
--- a/Teoria/CSS.pptx
+++ b/Teoria/CSS.pptx
@@ -127,7 +127,49 @@
       </a:defRPr>
     </a:lvl9pPr>
   </p:defaultTextStyle>
+  <p:extLst>
+    <p:ext uri="{EFAFB233-063F-42B5-8137-9DF3F51BA10A}">
+      <p15:sldGuideLst xmlns:p15="http://schemas.microsoft.com/office/powerpoint/2012/main"/>
+    </p:ext>
+  </p:extLst>
 </p:presentation>
+</file>
+
+<file path=ppt/changesInfos/changesInfo1.xml><?xml version="1.0" encoding="utf-8"?>
+<pc:chgInfo xmlns:a="http://schemas.openxmlformats.org/drawingml/2006/main" xmlns:r="http://schemas.openxmlformats.org/officeDocument/2006/relationships" xmlns:ac="http://schemas.microsoft.com/office/drawing/2013/main/command" xmlns:pc="http://schemas.microsoft.com/office/powerpoint/2013/main/command">
+  <pc:docChgLst>
+    <pc:chgData name="Sergio Sacristan Santero" userId="955dd7f0-91eb-4aab-8e1c-7d6c143bf99a" providerId="ADAL" clId="{91E0F2EB-47B5-402B-934C-D22613FE2292}"/>
+    <pc:docChg chg="modSld">
+      <pc:chgData name="Sergio Sacristan Santero" userId="955dd7f0-91eb-4aab-8e1c-7d6c143bf99a" providerId="ADAL" clId="{91E0F2EB-47B5-402B-934C-D22613FE2292}" dt="2022-03-21T14:02:41.717" v="12" actId="1076"/>
+      <pc:docMkLst>
+        <pc:docMk/>
+      </pc:docMkLst>
+      <pc:sldChg chg="addSp modSp mod">
+        <pc:chgData name="Sergio Sacristan Santero" userId="955dd7f0-91eb-4aab-8e1c-7d6c143bf99a" providerId="ADAL" clId="{91E0F2EB-47B5-402B-934C-D22613FE2292}" dt="2022-03-21T14:02:41.717" v="12" actId="1076"/>
+        <pc:sldMkLst>
+          <pc:docMk/>
+          <pc:sldMk cId="2670277603" sldId="256"/>
+        </pc:sldMkLst>
+        <pc:spChg chg="mod">
+          <ac:chgData name="Sergio Sacristan Santero" userId="955dd7f0-91eb-4aab-8e1c-7d6c143bf99a" providerId="ADAL" clId="{91E0F2EB-47B5-402B-934C-D22613FE2292}" dt="2022-03-21T14:02:27.917" v="11" actId="20577"/>
+          <ac:spMkLst>
+            <pc:docMk/>
+            <pc:sldMk cId="2670277603" sldId="256"/>
+            <ac:spMk id="3" creationId="{00000000-0000-0000-0000-000000000000}"/>
+          </ac:spMkLst>
+        </pc:spChg>
+        <pc:picChg chg="add mod">
+          <ac:chgData name="Sergio Sacristan Santero" userId="955dd7f0-91eb-4aab-8e1c-7d6c143bf99a" providerId="ADAL" clId="{91E0F2EB-47B5-402B-934C-D22613FE2292}" dt="2022-03-21T14:02:41.717" v="12" actId="1076"/>
+          <ac:picMkLst>
+            <pc:docMk/>
+            <pc:sldMk cId="2670277603" sldId="256"/>
+            <ac:picMk id="5" creationId="{2ACB6B77-0E86-4AB6-B4FE-6AF0F07155B6}"/>
+          </ac:picMkLst>
+        </pc:picChg>
+      </pc:sldChg>
+    </pc:docChg>
+  </pc:docChgLst>
+</pc:chgInfo>
 </file>
 
 <file path=ppt/slideLayouts/slideLayout1.xml><?xml version="1.0" encoding="utf-8"?>
@@ -438,7 +480,7 @@
           </a:lstStyle>
           <a:p>
             <a:r>
-              <a:rPr lang="es-ES" smtClean="0"/>
+              <a:rPr lang="es-ES"/>
               <a:t>Haga clic para modificar el estilo de título del patrón</a:t>
             </a:r>
             <a:endParaRPr lang="en-US" dirty="0"/>
@@ -509,7 +551,7 @@
           </a:lstStyle>
           <a:p>
             <a:r>
-              <a:rPr lang="es-ES" smtClean="0"/>
+              <a:rPr lang="es-ES"/>
               <a:t>Haga clic para modificar el estilo de subtítulo del patrón</a:t>
             </a:r>
             <a:endParaRPr lang="en-US" dirty="0"/>
@@ -533,7 +575,7 @@
           <a:p>
             <a:fld id="{83284890-85D2-4D7B-8EF5-15A9C1DB8F42}" type="datetimeFigureOut">
               <a:rPr lang="en-US" dirty="0"/>
-              <a:t>3/18/2022</a:t>
+              <a:t>3/21/2022</a:t>
             </a:fld>
             <a:endParaRPr lang="en-US" dirty="0"/>
           </a:p>
@@ -632,7 +674,7 @@
           <a:lstStyle/>
           <a:p>
             <a:r>
-              <a:rPr lang="es-ES" smtClean="0"/>
+              <a:rPr lang="es-ES"/>
               <a:t>Haga clic para modificar el estilo de título del patrón</a:t>
             </a:r>
             <a:endParaRPr lang="en-US" dirty="0"/>
@@ -656,35 +698,35 @@
           <a:p>
             <a:pPr lvl="0"/>
             <a:r>
-              <a:rPr lang="es-ES" smtClean="0"/>
+              <a:rPr lang="es-ES"/>
               <a:t>Haga clic para modificar el estilo de texto del patrón</a:t>
             </a:r>
           </a:p>
           <a:p>
             <a:pPr lvl="1"/>
             <a:r>
-              <a:rPr lang="es-ES" smtClean="0"/>
+              <a:rPr lang="es-ES"/>
               <a:t>Segundo nivel</a:t>
             </a:r>
           </a:p>
           <a:p>
             <a:pPr lvl="2"/>
             <a:r>
-              <a:rPr lang="es-ES" smtClean="0"/>
+              <a:rPr lang="es-ES"/>
               <a:t>Tercer nivel</a:t>
             </a:r>
           </a:p>
           <a:p>
             <a:pPr lvl="3"/>
             <a:r>
-              <a:rPr lang="es-ES" smtClean="0"/>
+              <a:rPr lang="es-ES"/>
               <a:t>Cuarto nivel</a:t>
             </a:r>
           </a:p>
           <a:p>
             <a:pPr lvl="4"/>
             <a:r>
-              <a:rPr lang="es-ES" smtClean="0"/>
+              <a:rPr lang="es-ES"/>
               <a:t>Quinto nivel</a:t>
             </a:r>
             <a:endParaRPr lang="en-US" dirty="0"/>
@@ -708,7 +750,7 @@
           <a:p>
             <a:fld id="{87157CC2-0FC8-4686-B024-99790E0F5162}" type="datetimeFigureOut">
               <a:rPr lang="en-US" dirty="0"/>
-              <a:t>3/18/2022</a:t>
+              <a:t>3/21/2022</a:t>
             </a:fld>
             <a:endParaRPr lang="en-US" dirty="0"/>
           </a:p>
@@ -802,7 +844,7 @@
           <a:lstStyle/>
           <a:p>
             <a:r>
-              <a:rPr lang="es-ES" smtClean="0"/>
+              <a:rPr lang="es-ES"/>
               <a:t>Haga clic para modificar el estilo de título del patrón</a:t>
             </a:r>
             <a:endParaRPr lang="en-US" dirty="0"/>
@@ -831,35 +873,35 @@
           <a:p>
             <a:pPr lvl="0"/>
             <a:r>
-              <a:rPr lang="es-ES" smtClean="0"/>
+              <a:rPr lang="es-ES"/>
               <a:t>Haga clic para modificar el estilo de texto del patrón</a:t>
             </a:r>
           </a:p>
           <a:p>
             <a:pPr lvl="1"/>
             <a:r>
-              <a:rPr lang="es-ES" smtClean="0"/>
+              <a:rPr lang="es-ES"/>
               <a:t>Segundo nivel</a:t>
             </a:r>
           </a:p>
           <a:p>
             <a:pPr lvl="2"/>
             <a:r>
-              <a:rPr lang="es-ES" smtClean="0"/>
+              <a:rPr lang="es-ES"/>
               <a:t>Tercer nivel</a:t>
             </a:r>
           </a:p>
           <a:p>
             <a:pPr lvl="3"/>
             <a:r>
-              <a:rPr lang="es-ES" smtClean="0"/>
+              <a:rPr lang="es-ES"/>
               <a:t>Cuarto nivel</a:t>
             </a:r>
           </a:p>
           <a:p>
             <a:pPr lvl="4"/>
             <a:r>
-              <a:rPr lang="es-ES" smtClean="0"/>
+              <a:rPr lang="es-ES"/>
               <a:t>Quinto nivel</a:t>
             </a:r>
             <a:endParaRPr lang="en-US" dirty="0"/>
@@ -883,7 +925,7 @@
           <a:p>
             <a:fld id="{F6764DA5-CD3D-4590-A511-FCD3BC7A793E}" type="datetimeFigureOut">
               <a:rPr lang="en-US" dirty="0"/>
-              <a:t>3/18/2022</a:t>
+              <a:t>3/21/2022</a:t>
             </a:fld>
             <a:endParaRPr lang="en-US" dirty="0"/>
           </a:p>
@@ -972,7 +1014,7 @@
           <a:lstStyle/>
           <a:p>
             <a:r>
-              <a:rPr lang="es-ES" smtClean="0"/>
+              <a:rPr lang="es-ES"/>
               <a:t>Haga clic para modificar el estilo de título del patrón</a:t>
             </a:r>
             <a:endParaRPr lang="en-US" dirty="0"/>
@@ -996,35 +1038,35 @@
           <a:p>
             <a:pPr lvl="0"/>
             <a:r>
-              <a:rPr lang="es-ES" smtClean="0"/>
+              <a:rPr lang="es-ES"/>
               <a:t>Haga clic para modificar el estilo de texto del patrón</a:t>
             </a:r>
           </a:p>
           <a:p>
             <a:pPr lvl="1"/>
             <a:r>
-              <a:rPr lang="es-ES" smtClean="0"/>
+              <a:rPr lang="es-ES"/>
               <a:t>Segundo nivel</a:t>
             </a:r>
           </a:p>
           <a:p>
             <a:pPr lvl="2"/>
             <a:r>
-              <a:rPr lang="es-ES" smtClean="0"/>
+              <a:rPr lang="es-ES"/>
               <a:t>Tercer nivel</a:t>
             </a:r>
           </a:p>
           <a:p>
             <a:pPr lvl="3"/>
             <a:r>
-              <a:rPr lang="es-ES" smtClean="0"/>
+              <a:rPr lang="es-ES"/>
               <a:t>Cuarto nivel</a:t>
             </a:r>
           </a:p>
           <a:p>
             <a:pPr lvl="4"/>
             <a:r>
-              <a:rPr lang="es-ES" smtClean="0"/>
+              <a:rPr lang="es-ES"/>
               <a:t>Quinto nivel</a:t>
             </a:r>
             <a:endParaRPr lang="en-US" dirty="0"/>
@@ -1048,7 +1090,7 @@
           <a:p>
             <a:fld id="{82F5661D-6934-4B32-B92C-470368BF1EC6}" type="datetimeFigureOut">
               <a:rPr lang="en-US" dirty="0"/>
-              <a:t>3/18/2022</a:t>
+              <a:t>3/21/2022</a:t>
             </a:fld>
             <a:endParaRPr lang="en-US" dirty="0"/>
           </a:p>
@@ -1208,7 +1250,7 @@
           </a:lstStyle>
           <a:p>
             <a:r>
-              <a:rPr lang="es-ES" smtClean="0"/>
+              <a:rPr lang="es-ES"/>
               <a:t>Haga clic para modificar el estilo de título del patrón</a:t>
             </a:r>
             <a:endParaRPr lang="en-US" dirty="0"/>
@@ -1328,7 +1370,7 @@
           <a:p>
             <a:pPr lvl="0"/>
             <a:r>
-              <a:rPr lang="es-ES" smtClean="0"/>
+              <a:rPr lang="es-ES"/>
               <a:t>Haga clic para modificar el estilo de texto del patrón</a:t>
             </a:r>
           </a:p>
@@ -1356,7 +1398,7 @@
           <a:p>
             <a:fld id="{C6F822A4-8DA6-4447-9B1F-C5DB58435268}" type="datetimeFigureOut">
               <a:rPr lang="en-US" dirty="0"/>
-              <a:t>3/18/2022</a:t>
+              <a:t>3/21/2022</a:t>
             </a:fld>
             <a:endParaRPr lang="en-US" dirty="0"/>
           </a:p>
@@ -1544,7 +1586,7 @@
           <a:lstStyle/>
           <a:p>
             <a:r>
-              <a:rPr lang="es-ES" smtClean="0"/>
+              <a:rPr lang="es-ES"/>
               <a:t>Haga clic para modificar el estilo de título del patrón</a:t>
             </a:r>
             <a:endParaRPr lang="en-US" dirty="0"/>
@@ -1601,35 +1643,35 @@
           <a:p>
             <a:pPr lvl="0"/>
             <a:r>
-              <a:rPr lang="es-ES" smtClean="0"/>
+              <a:rPr lang="es-ES"/>
               <a:t>Haga clic para modificar el estilo de texto del patrón</a:t>
             </a:r>
           </a:p>
           <a:p>
             <a:pPr lvl="1"/>
             <a:r>
-              <a:rPr lang="es-ES" smtClean="0"/>
+              <a:rPr lang="es-ES"/>
               <a:t>Segundo nivel</a:t>
             </a:r>
           </a:p>
           <a:p>
             <a:pPr lvl="2"/>
             <a:r>
-              <a:rPr lang="es-ES" smtClean="0"/>
+              <a:rPr lang="es-ES"/>
               <a:t>Tercer nivel</a:t>
             </a:r>
           </a:p>
           <a:p>
             <a:pPr lvl="3"/>
             <a:r>
-              <a:rPr lang="es-ES" smtClean="0"/>
+              <a:rPr lang="es-ES"/>
               <a:t>Cuarto nivel</a:t>
             </a:r>
           </a:p>
           <a:p>
             <a:pPr lvl="4"/>
             <a:r>
-              <a:rPr lang="es-ES" smtClean="0"/>
+              <a:rPr lang="es-ES"/>
               <a:t>Quinto nivel</a:t>
             </a:r>
             <a:endParaRPr lang="en-US" dirty="0"/>
@@ -1686,35 +1728,35 @@
           <a:p>
             <a:pPr lvl="0"/>
             <a:r>
-              <a:rPr lang="es-ES" smtClean="0"/>
+              <a:rPr lang="es-ES"/>
               <a:t>Haga clic para modificar el estilo de texto del patrón</a:t>
             </a:r>
           </a:p>
           <a:p>
             <a:pPr lvl="1"/>
             <a:r>
-              <a:rPr lang="es-ES" smtClean="0"/>
+              <a:rPr lang="es-ES"/>
               <a:t>Segundo nivel</a:t>
             </a:r>
           </a:p>
           <a:p>
             <a:pPr lvl="2"/>
             <a:r>
-              <a:rPr lang="es-ES" smtClean="0"/>
+              <a:rPr lang="es-ES"/>
               <a:t>Tercer nivel</a:t>
             </a:r>
           </a:p>
           <a:p>
             <a:pPr lvl="3"/>
             <a:r>
-              <a:rPr lang="es-ES" smtClean="0"/>
+              <a:rPr lang="es-ES"/>
               <a:t>Cuarto nivel</a:t>
             </a:r>
           </a:p>
           <a:p>
             <a:pPr lvl="4"/>
             <a:r>
-              <a:rPr lang="es-ES" smtClean="0"/>
+              <a:rPr lang="es-ES"/>
               <a:t>Quinto nivel</a:t>
             </a:r>
             <a:endParaRPr lang="en-US" dirty="0"/>
@@ -1738,7 +1780,7 @@
           <a:p>
             <a:fld id="{E548D31E-DCDA-41A7-9C67-C4B11B94D21D}" type="datetimeFigureOut">
               <a:rPr lang="en-US" dirty="0"/>
-              <a:t>3/18/2022</a:t>
+              <a:t>3/21/2022</a:t>
             </a:fld>
             <a:endParaRPr lang="en-US" dirty="0"/>
           </a:p>
@@ -1827,7 +1869,7 @@
           <a:lstStyle/>
           <a:p>
             <a:r>
-              <a:rPr lang="es-ES" smtClean="0"/>
+              <a:rPr lang="es-ES"/>
               <a:t>Haga clic para modificar el estilo de título del patrón</a:t>
             </a:r>
             <a:endParaRPr lang="en-US" dirty="0"/>
@@ -1901,7 +1943,7 @@
           <a:p>
             <a:pPr lvl="0"/>
             <a:r>
-              <a:rPr lang="es-ES" smtClean="0"/>
+              <a:rPr lang="es-ES"/>
               <a:t>Haga clic para modificar el estilo de texto del patrón</a:t>
             </a:r>
           </a:p>
@@ -1957,35 +1999,35 @@
           <a:p>
             <a:pPr lvl="0"/>
             <a:r>
-              <a:rPr lang="es-ES" smtClean="0"/>
+              <a:rPr lang="es-ES"/>
               <a:t>Haga clic para modificar el estilo de texto del patrón</a:t>
             </a:r>
           </a:p>
           <a:p>
             <a:pPr lvl="1"/>
             <a:r>
-              <a:rPr lang="es-ES" smtClean="0"/>
+              <a:rPr lang="es-ES"/>
               <a:t>Segundo nivel</a:t>
             </a:r>
           </a:p>
           <a:p>
             <a:pPr lvl="2"/>
             <a:r>
-              <a:rPr lang="es-ES" smtClean="0"/>
+              <a:rPr lang="es-ES"/>
               <a:t>Tercer nivel</a:t>
             </a:r>
           </a:p>
           <a:p>
             <a:pPr lvl="3"/>
             <a:r>
-              <a:rPr lang="es-ES" smtClean="0"/>
+              <a:rPr lang="es-ES"/>
               <a:t>Cuarto nivel</a:t>
             </a:r>
           </a:p>
           <a:p>
             <a:pPr lvl="4"/>
             <a:r>
-              <a:rPr lang="es-ES" smtClean="0"/>
+              <a:rPr lang="es-ES"/>
               <a:t>Quinto nivel</a:t>
             </a:r>
             <a:endParaRPr lang="en-US" dirty="0"/>
@@ -2059,7 +2101,7 @@
           <a:p>
             <a:pPr lvl="0"/>
             <a:r>
-              <a:rPr lang="es-ES" smtClean="0"/>
+              <a:rPr lang="es-ES"/>
               <a:t>Haga clic para modificar el estilo de texto del patrón</a:t>
             </a:r>
           </a:p>
@@ -2115,35 +2157,35 @@
           <a:p>
             <a:pPr lvl="0"/>
             <a:r>
-              <a:rPr lang="es-ES" smtClean="0"/>
+              <a:rPr lang="es-ES"/>
               <a:t>Haga clic para modificar el estilo de texto del patrón</a:t>
             </a:r>
           </a:p>
           <a:p>
             <a:pPr lvl="1"/>
             <a:r>
-              <a:rPr lang="es-ES" smtClean="0"/>
+              <a:rPr lang="es-ES"/>
               <a:t>Segundo nivel</a:t>
             </a:r>
           </a:p>
           <a:p>
             <a:pPr lvl="2"/>
             <a:r>
-              <a:rPr lang="es-ES" smtClean="0"/>
+              <a:rPr lang="es-ES"/>
               <a:t>Tercer nivel</a:t>
             </a:r>
           </a:p>
           <a:p>
             <a:pPr lvl="3"/>
             <a:r>
-              <a:rPr lang="es-ES" smtClean="0"/>
+              <a:rPr lang="es-ES"/>
               <a:t>Cuarto nivel</a:t>
             </a:r>
           </a:p>
           <a:p>
             <a:pPr lvl="4"/>
             <a:r>
-              <a:rPr lang="es-ES" smtClean="0"/>
+              <a:rPr lang="es-ES"/>
               <a:t>Quinto nivel</a:t>
             </a:r>
             <a:endParaRPr lang="en-US" dirty="0"/>
@@ -2167,7 +2209,7 @@
           <a:p>
             <a:fld id="{9B3762C0-B258-48F1-ADE6-176B4174CCDD}" type="datetimeFigureOut">
               <a:rPr lang="en-US" dirty="0"/>
-              <a:t>3/18/2022</a:t>
+              <a:t>3/21/2022</a:t>
             </a:fld>
             <a:endParaRPr lang="en-US" dirty="0"/>
           </a:p>
@@ -2256,7 +2298,7 @@
           <a:lstStyle/>
           <a:p>
             <a:r>
-              <a:rPr lang="es-ES" smtClean="0"/>
+              <a:rPr lang="es-ES"/>
               <a:t>Haga clic para modificar el estilo de título del patrón</a:t>
             </a:r>
             <a:endParaRPr lang="en-US" dirty="0"/>
@@ -2280,7 +2322,7 @@
           <a:p>
             <a:fld id="{677919A6-33EB-49BD-A62F-1FA56B9F9712}" type="datetimeFigureOut">
               <a:rPr lang="en-US" dirty="0"/>
-              <a:t>3/18/2022</a:t>
+              <a:t>3/21/2022</a:t>
             </a:fld>
             <a:endParaRPr lang="en-US" dirty="0"/>
           </a:p>
@@ -2370,7 +2412,7 @@
           <a:p>
             <a:fld id="{CA4E7D1B-D673-4CF6-8672-009D42ABD2A0}" type="datetimeFigureOut">
               <a:rPr lang="en-US" dirty="0"/>
-              <a:t>3/18/2022</a:t>
+              <a:t>3/21/2022</a:t>
             </a:fld>
             <a:endParaRPr lang="en-US" dirty="0"/>
           </a:p>
@@ -2527,7 +2569,7 @@
           </a:lstStyle>
           <a:p>
             <a:r>
-              <a:rPr lang="es-ES" smtClean="0"/>
+              <a:rPr lang="es-ES"/>
               <a:t>Haga clic para modificar el estilo de título del patrón</a:t>
             </a:r>
             <a:endParaRPr lang="en-US" dirty="0"/>
@@ -2584,35 +2626,35 @@
           <a:p>
             <a:pPr lvl="0"/>
             <a:r>
-              <a:rPr lang="es-ES" smtClean="0"/>
+              <a:rPr lang="es-ES"/>
               <a:t>Haga clic para modificar el estilo de texto del patrón</a:t>
             </a:r>
           </a:p>
           <a:p>
             <a:pPr lvl="1"/>
             <a:r>
-              <a:rPr lang="es-ES" smtClean="0"/>
+              <a:rPr lang="es-ES"/>
               <a:t>Segundo nivel</a:t>
             </a:r>
           </a:p>
           <a:p>
             <a:pPr lvl="2"/>
             <a:r>
-              <a:rPr lang="es-ES" smtClean="0"/>
+              <a:rPr lang="es-ES"/>
               <a:t>Tercer nivel</a:t>
             </a:r>
           </a:p>
           <a:p>
             <a:pPr lvl="3"/>
             <a:r>
-              <a:rPr lang="es-ES" smtClean="0"/>
+              <a:rPr lang="es-ES"/>
               <a:t>Cuarto nivel</a:t>
             </a:r>
           </a:p>
           <a:p>
             <a:pPr lvl="4"/>
             <a:r>
-              <a:rPr lang="es-ES" smtClean="0"/>
+              <a:rPr lang="es-ES"/>
               <a:t>Quinto nivel</a:t>
             </a:r>
             <a:endParaRPr lang="en-US" dirty="0"/>
@@ -2692,7 +2734,7 @@
           <a:p>
             <a:pPr lvl="0"/>
             <a:r>
-              <a:rPr lang="es-ES" smtClean="0"/>
+              <a:rPr lang="es-ES"/>
               <a:t>Haga clic para modificar el estilo de texto del patrón</a:t>
             </a:r>
           </a:p>
@@ -2715,7 +2757,7 @@
           <a:p>
             <a:fld id="{DA16AA21-1863-4931-97CB-99D0A168701B}" type="datetimeFigureOut">
               <a:rPr lang="en-US" dirty="0"/>
-              <a:t>3/18/2022</a:t>
+              <a:t>3/21/2022</a:t>
             </a:fld>
             <a:endParaRPr lang="en-US" dirty="0"/>
           </a:p>
@@ -2961,7 +3003,7 @@
           </a:lstStyle>
           <a:p>
             <a:r>
-              <a:rPr lang="es-ES" smtClean="0"/>
+              <a:rPr lang="es-ES"/>
               <a:t>Haga clic para modificar el estilo de título del patrón</a:t>
             </a:r>
             <a:endParaRPr lang="en-US" dirty="0"/>
@@ -3032,7 +3074,7 @@
           </a:lstStyle>
           <a:p>
             <a:r>
-              <a:rPr lang="es-ES" smtClean="0"/>
+              <a:rPr lang="es-ES"/>
               <a:t>Haga clic en el icono para agregar una imagen</a:t>
             </a:r>
             <a:endParaRPr lang="en-US" dirty="0"/>
@@ -3112,7 +3154,7 @@
           <a:p>
             <a:pPr lvl="0"/>
             <a:r>
-              <a:rPr lang="es-ES" smtClean="0"/>
+              <a:rPr lang="es-ES"/>
               <a:t>Haga clic para modificar el estilo de texto del patrón</a:t>
             </a:r>
           </a:p>
@@ -3135,7 +3177,7 @@
           <a:p>
             <a:fld id="{3772C379-9A7C-4C87-A116-CBE9F58B04C5}" type="datetimeFigureOut">
               <a:rPr lang="en-US" dirty="0"/>
-              <a:t>3/18/2022</a:t>
+              <a:t>3/21/2022</a:t>
             </a:fld>
             <a:endParaRPr lang="en-US" dirty="0"/>
           </a:p>
@@ -3309,7 +3351,7 @@
           <a:lstStyle/>
           <a:p>
             <a:r>
-              <a:rPr lang="es-ES" smtClean="0"/>
+              <a:rPr lang="es-ES"/>
               <a:t>Haga clic para modificar el estilo de título del patrón</a:t>
             </a:r>
             <a:endParaRPr lang="en-US" dirty="0"/>
@@ -3343,35 +3385,35 @@
           <a:p>
             <a:pPr lvl="0"/>
             <a:r>
-              <a:rPr lang="es-ES" smtClean="0"/>
+              <a:rPr lang="es-ES"/>
               <a:t>Haga clic para modificar el estilo de texto del patrón</a:t>
             </a:r>
           </a:p>
           <a:p>
             <a:pPr lvl="1"/>
             <a:r>
-              <a:rPr lang="es-ES" smtClean="0"/>
+              <a:rPr lang="es-ES"/>
               <a:t>Segundo nivel</a:t>
             </a:r>
           </a:p>
           <a:p>
             <a:pPr lvl="2"/>
             <a:r>
-              <a:rPr lang="es-ES" smtClean="0"/>
+              <a:rPr lang="es-ES"/>
               <a:t>Tercer nivel</a:t>
             </a:r>
           </a:p>
           <a:p>
             <a:pPr lvl="3"/>
             <a:r>
-              <a:rPr lang="es-ES" smtClean="0"/>
+              <a:rPr lang="es-ES"/>
               <a:t>Cuarto nivel</a:t>
             </a:r>
           </a:p>
           <a:p>
             <a:pPr lvl="4"/>
             <a:r>
-              <a:rPr lang="es-ES" smtClean="0"/>
+              <a:rPr lang="es-ES"/>
               <a:t>Quinto nivel</a:t>
             </a:r>
             <a:endParaRPr lang="en-US" dirty="0"/>
@@ -3411,7 +3453,7 @@
           <a:p>
             <a:fld id="{8664C608-40B1-4030-A28D-5B74BC98ADCE}" type="datetimeFigureOut">
               <a:rPr lang="en-US" dirty="0"/>
-              <a:t>3/18/2022</a:t>
+              <a:t>3/21/2022</a:t>
             </a:fld>
             <a:endParaRPr lang="en-US" dirty="0"/>
           </a:p>
@@ -4000,14 +4042,13 @@
           <a:lstStyle/>
           <a:p>
             <a:r>
-              <a:rPr lang="es-ES" dirty="0" err="1" smtClean="0"/>
+              <a:rPr lang="es-ES" dirty="0" err="1"/>
               <a:t>Css</a:t>
             </a:r>
             <a:r>
-              <a:rPr lang="es-ES" dirty="0" smtClean="0"/>
+              <a:rPr lang="es-ES" dirty="0"/>
               <a:t>	</a:t>
             </a:r>
-            <a:endParaRPr lang="es-ES" dirty="0"/>
           </a:p>
         </p:txBody>
       </p:sp>
@@ -4027,13 +4068,42 @@
           <a:lstStyle/>
           <a:p>
             <a:r>
-              <a:rPr lang="es-ES" dirty="0" smtClean="0"/>
-              <a:t>Web Comercial</a:t>
-            </a:r>
-            <a:endParaRPr lang="es-ES" dirty="0"/>
-          </a:p>
-        </p:txBody>
-      </p:sp>
+              <a:rPr lang="es-ES" dirty="0"/>
+              <a:t>Web Comercial Iberdrola</a:t>
+            </a:r>
+          </a:p>
+        </p:txBody>
+      </p:sp>
+      <p:pic>
+        <p:nvPicPr>
+          <p:cNvPr id="5" name="Imagen 4">
+            <a:extLst>
+              <a:ext uri="{FF2B5EF4-FFF2-40B4-BE49-F238E27FC236}">
+                <a16:creationId xmlns:a16="http://schemas.microsoft.com/office/drawing/2014/main" id="{2ACB6B77-0E86-4AB6-B4FE-6AF0F07155B6}"/>
+              </a:ext>
+            </a:extLst>
+          </p:cNvPr>
+          <p:cNvPicPr>
+            <a:picLocks noChangeAspect="1"/>
+          </p:cNvPicPr>
+          <p:nvPr/>
+        </p:nvPicPr>
+        <p:blipFill>
+          <a:blip r:embed="rId2"/>
+          <a:stretch>
+            <a:fillRect/>
+          </a:stretch>
+        </p:blipFill>
+        <p:spPr>
+          <a:xfrm>
+            <a:off x="4992052" y="5306137"/>
+            <a:ext cx="2085975" cy="942975"/>
+          </a:xfrm>
+          <a:prstGeom prst="rect">
+            <a:avLst/>
+          </a:prstGeom>
+        </p:spPr>
+      </p:pic>
     </p:spTree>
     <p:extLst>
       <p:ext uri="{BB962C8B-B14F-4D97-AF65-F5344CB8AC3E}">
@@ -4085,7 +4155,7 @@
           <a:lstStyle/>
           <a:p>
             <a:r>
-              <a:rPr lang="es-ES" dirty="0" smtClean="0"/>
+              <a:rPr lang="es-ES" dirty="0"/>
               <a:t>Position: </a:t>
             </a:r>
           </a:p>
@@ -4094,7 +4164,7 @@
               <a:buNone/>
             </a:pPr>
             <a:r>
-              <a:rPr lang="es-ES" dirty="0" smtClean="0"/>
+              <a:rPr lang="es-ES" dirty="0"/>
               <a:t>utilizado para configurar rápidamente la posición de un elemento</a:t>
             </a:r>
           </a:p>
@@ -4102,7 +4172,7 @@
             <a:pPr marL="0" indent="0">
               <a:buNone/>
             </a:pPr>
-            <a:endParaRPr lang="es-ES" dirty="0" smtClean="0"/>
+            <a:endParaRPr lang="es-ES" dirty="0"/>
           </a:p>
           <a:p>
             <a:pPr marL="0" indent="0">
@@ -4110,13 +4180,8 @@
             </a:pPr>
             <a:r>
               <a:rPr lang="es-ES" dirty="0"/>
-              <a:t>	</a:t>
-            </a:r>
-            <a:r>
-              <a:rPr lang="es-ES" dirty="0" smtClean="0"/>
-              <a:t>			</a:t>
-            </a:r>
-            <a:endParaRPr lang="es-ES" dirty="0"/>
+              <a:t>				</a:t>
+            </a:r>
           </a:p>
         </p:txBody>
       </p:sp>
@@ -4437,11 +4502,11 @@
           <a:lstStyle/>
           <a:p>
             <a:r>
-              <a:rPr lang="es-ES" dirty="0" err="1" smtClean="0"/>
+              <a:rPr lang="es-ES" dirty="0" err="1"/>
               <a:t>Overflow</a:t>
             </a:r>
             <a:r>
-              <a:rPr lang="es-ES" dirty="0" smtClean="0"/>
+              <a:rPr lang="es-ES" dirty="0"/>
               <a:t>:</a:t>
             </a:r>
           </a:p>
@@ -4454,59 +4519,35 @@
               <a:t>La propiedad CSS </a:t>
             </a:r>
             <a:r>
-              <a:rPr lang="es-ES" sz="1600" dirty="0" err="1" smtClean="0"/>
-              <a:t>overflow</a:t>
-            </a:r>
-            <a:r>
-              <a:rPr lang="es-ES" sz="1600" dirty="0" smtClean="0"/>
-              <a:t> controla </a:t>
-            </a:r>
-            <a:r>
-              <a:rPr lang="es-ES" sz="1600" dirty="0"/>
-              <a:t>lo que sucede con el contenido que es demasiado </a:t>
-            </a:r>
-            <a:r>
-              <a:rPr lang="es-ES" sz="1600" dirty="0" smtClean="0"/>
-              <a:t>grande </a:t>
-            </a:r>
-            <a:r>
-              <a:rPr lang="es-ES" sz="1600" dirty="0"/>
-              <a:t>para caber en un área</a:t>
-            </a:r>
-            <a:r>
-              <a:rPr lang="es-ES" sz="1600" dirty="0" smtClean="0"/>
-              <a:t>.</a:t>
-            </a:r>
-          </a:p>
-          <a:p>
-            <a:pPr marL="0" indent="0">
-              <a:buNone/>
-            </a:pPr>
-            <a:endParaRPr lang="es-ES" sz="1600" dirty="0" smtClean="0"/>
-          </a:p>
-          <a:p>
-            <a:pPr marL="0" indent="0">
-              <a:buNone/>
-            </a:pPr>
-            <a:r>
-              <a:rPr lang="es-ES" sz="1600" dirty="0"/>
-              <a:t>La </a:t>
-            </a:r>
-            <a:r>
-              <a:rPr lang="es-ES" sz="1600" dirty="0" smtClean="0"/>
-              <a:t>propiedad </a:t>
-            </a:r>
-            <a:r>
               <a:rPr lang="es-ES" sz="1600" dirty="0" err="1"/>
               <a:t>overflow</a:t>
             </a:r>
             <a:r>
-              <a:rPr lang="es-ES" sz="1600" dirty="0" smtClean="0"/>
-              <a:t> </a:t>
-            </a:r>
-            <a:r>
               <a:rPr lang="es-ES" sz="1600" dirty="0"/>
-              <a:t>tiene los siguientes valores:</a:t>
+              <a:t> controla lo que sucede con el contenido que es demasiado grande para caber en un área.</a:t>
+            </a:r>
+          </a:p>
+          <a:p>
+            <a:pPr marL="0" indent="0">
+              <a:buNone/>
+            </a:pPr>
+            <a:endParaRPr lang="es-ES" sz="1600" dirty="0"/>
+          </a:p>
+          <a:p>
+            <a:pPr marL="0" indent="0">
+              <a:buNone/>
+            </a:pPr>
+            <a:r>
+              <a:rPr lang="es-ES" sz="1600" dirty="0"/>
+              <a:t>La propiedad </a:t>
+            </a:r>
+            <a:r>
+              <a:rPr lang="es-ES" sz="1600" dirty="0" err="1"/>
+              <a:t>overflow</a:t>
+            </a:r>
+            <a:r>
+              <a:rPr lang="es-ES" sz="1600" dirty="0"/>
+              <a:t> tiene los siguientes valores:</a:t>
             </a:r>
           </a:p>
           <a:p>
@@ -4522,18 +4563,14 @@
             </a:pPr>
             <a:r>
               <a:rPr lang="es-ES" sz="1600" dirty="0"/>
-              <a:t>visible- Por defecto. El desbordamiento no se recorta. El contenido se muestra fuera de la caja del elemento</a:t>
-            </a:r>
-            <a:r>
-              <a:rPr lang="es-ES" sz="1600" dirty="0" smtClean="0"/>
-              <a:t>.</a:t>
+              <a:t>visible- Por defecto. El desbordamiento no se recorta. El contenido se muestra fuera de la caja del elemento.</a:t>
             </a:r>
           </a:p>
           <a:p>
             <a:pPr marL="0" indent="0">
               <a:buNone/>
             </a:pPr>
-            <a:endParaRPr lang="es-ES" sz="1600" dirty="0" smtClean="0"/>
+            <a:endParaRPr lang="es-ES" sz="1600" dirty="0"/>
           </a:p>
           <a:p>
             <a:pPr marL="0" indent="0">
@@ -4545,7 +4582,7 @@
             <a:pPr marL="0" indent="0">
               <a:buNone/>
             </a:pPr>
-            <a:endParaRPr lang="es-ES" sz="1600" dirty="0" smtClean="0"/>
+            <a:endParaRPr lang="es-ES" sz="1600" dirty="0"/>
           </a:p>
           <a:p>
             <a:pPr marL="0" indent="0">
@@ -4557,7 +4594,7 @@
             <a:pPr marL="0" indent="0">
               <a:buNone/>
             </a:pPr>
-            <a:endParaRPr lang="es-ES" sz="1600" dirty="0" smtClean="0"/>
+            <a:endParaRPr lang="es-ES" sz="1600" dirty="0"/>
           </a:p>
           <a:p>
             <a:pPr marL="0" indent="0">
@@ -4648,20 +4685,12 @@
               <a:buChar char="o"/>
             </a:pPr>
             <a:r>
-              <a:rPr lang="es-ES" sz="1600" dirty="0" err="1" smtClean="0"/>
+              <a:rPr lang="es-ES" sz="1600" dirty="0" err="1"/>
               <a:t>hidden</a:t>
             </a:r>
             <a:r>
-              <a:rPr lang="es-ES" sz="1600" dirty="0" smtClean="0"/>
-              <a:t>- </a:t>
-            </a:r>
-            <a:r>
               <a:rPr lang="es-ES" sz="1600" dirty="0"/>
-              <a:t>El desbordamiento se recorta y el resto del contenido será </a:t>
-            </a:r>
-            <a:r>
-              <a:rPr lang="es-ES" sz="1600" dirty="0" smtClean="0"/>
-              <a:t>invisible</a:t>
+              <a:t>- El desbordamiento se recorta y el resto del contenido será invisible</a:t>
             </a:r>
           </a:p>
           <a:p>
@@ -4676,13 +4705,13 @@
               <a:buFont typeface="Courier New" panose="02070309020205020404" pitchFamily="49" charset="0"/>
               <a:buChar char="o"/>
             </a:pPr>
-            <a:endParaRPr lang="es-ES" sz="1600" dirty="0" smtClean="0"/>
+            <a:endParaRPr lang="es-ES" sz="1600" dirty="0"/>
           </a:p>
           <a:p>
             <a:pPr marL="0" indent="0">
               <a:buNone/>
             </a:pPr>
-            <a:endParaRPr lang="es-ES" sz="1600" dirty="0" smtClean="0"/>
+            <a:endParaRPr lang="es-ES" sz="1600" dirty="0"/>
           </a:p>
           <a:p>
             <a:pPr marL="0" indent="0">
@@ -4694,7 +4723,7 @@
             <a:pPr marL="0" indent="0">
               <a:buNone/>
             </a:pPr>
-            <a:endParaRPr lang="es-ES" sz="1600" dirty="0" smtClean="0"/>
+            <a:endParaRPr lang="es-ES" sz="1600" dirty="0"/>
           </a:p>
           <a:p>
             <a:pPr marL="0" indent="0">
@@ -4706,13 +4735,13 @@
             <a:pPr marL="0" indent="0">
               <a:buNone/>
             </a:pPr>
-            <a:endParaRPr lang="es-ES" sz="1600" dirty="0" smtClean="0"/>
+            <a:endParaRPr lang="es-ES" sz="1600" dirty="0"/>
           </a:p>
           <a:p>
             <a:pPr marL="0" indent="0">
               <a:buNone/>
             </a:pPr>
-            <a:endParaRPr lang="es-ES" sz="1600" dirty="0" smtClean="0"/>
+            <a:endParaRPr lang="es-ES" sz="1600" dirty="0"/>
           </a:p>
           <a:p>
             <a:pPr>
@@ -4720,27 +4749,19 @@
               <a:buChar char="o"/>
             </a:pPr>
             <a:r>
-              <a:rPr lang="es-ES" sz="1600" dirty="0" err="1" smtClean="0"/>
+              <a:rPr lang="es-ES" sz="1600" dirty="0" err="1"/>
               <a:t>scroll</a:t>
             </a:r>
             <a:r>
-              <a:rPr lang="es-ES" sz="1600" dirty="0" smtClean="0"/>
-              <a:t>- </a:t>
-            </a:r>
-            <a:r>
               <a:rPr lang="es-ES" sz="1600" dirty="0"/>
-              <a:t>El desbordamiento se recorta y se agrega una barra de desplazamiento para ver el resto del </a:t>
-            </a:r>
-            <a:r>
-              <a:rPr lang="es-ES" sz="1600" dirty="0" smtClean="0"/>
-              <a:t>contenido.</a:t>
+              <a:t>- El desbordamiento se recorta y se agrega una barra de desplazamiento para ver el resto del contenido.</a:t>
             </a:r>
           </a:p>
           <a:p>
             <a:pPr marL="0" indent="0">
               <a:buNone/>
             </a:pPr>
-            <a:endParaRPr lang="es-ES" sz="1600" dirty="0" smtClean="0"/>
+            <a:endParaRPr lang="es-ES" sz="1600" dirty="0"/>
           </a:p>
           <a:p>
             <a:pPr marL="0" indent="0">
@@ -4861,32 +4882,16 @@
               <a:buChar char="o"/>
             </a:pPr>
             <a:r>
-              <a:rPr lang="es-ES" sz="1600" dirty="0" smtClean="0"/>
-              <a:t>auto- </a:t>
-            </a:r>
-            <a:r>
               <a:rPr lang="es-ES" sz="1600" dirty="0"/>
-              <a:t>Similar a </a:t>
-            </a:r>
-            <a:r>
-              <a:rPr lang="es-ES" sz="1600" dirty="0" err="1" smtClean="0"/>
+              <a:t>auto- Similar a </a:t>
+            </a:r>
+            <a:r>
+              <a:rPr lang="es-ES" sz="1600" dirty="0" err="1"/>
               <a:t>scroll</a:t>
             </a:r>
             <a:r>
               <a:rPr lang="es-ES" sz="1600" dirty="0"/>
-              <a:t>, pero agrega </a:t>
-            </a:r>
-            <a:r>
-              <a:rPr lang="es-ES" sz="1600" dirty="0" smtClean="0"/>
-              <a:t>barras </a:t>
-            </a:r>
-            <a:r>
-              <a:rPr lang="es-ES" sz="1600" dirty="0"/>
-              <a:t>de desplazamiento solo cuando es </a:t>
-            </a:r>
-            <a:r>
-              <a:rPr lang="es-ES" sz="1600" dirty="0" smtClean="0"/>
-              <a:t>necesario</a:t>
+              <a:t>, pero agrega barras de desplazamiento solo cuando es necesario</a:t>
             </a:r>
           </a:p>
           <a:p>
@@ -4975,26 +4980,21 @@
           <a:lstStyle/>
           <a:p>
             <a:r>
-              <a:rPr lang="es-ES" dirty="0" err="1" smtClean="0"/>
+              <a:rPr lang="es-ES" dirty="0" err="1"/>
               <a:t>Display</a:t>
             </a:r>
             <a:r>
               <a:rPr lang="es-ES" dirty="0"/>
               <a:t>: </a:t>
             </a:r>
-            <a:endParaRPr lang="es-ES" dirty="0" smtClean="0"/>
           </a:p>
           <a:p>
             <a:pPr marL="0" indent="0" algn="just">
               <a:buNone/>
             </a:pPr>
             <a:r>
-              <a:rPr lang="es-ES" dirty="0" smtClean="0"/>
-              <a:t>La </a:t>
-            </a:r>
-            <a:r>
               <a:rPr lang="es-ES" dirty="0"/>
-              <a:t>propiedad </a:t>
+              <a:t>La propiedad </a:t>
             </a:r>
             <a:r>
               <a:rPr lang="es-ES" dirty="0" err="1"/>
@@ -5026,24 +5026,20 @@
             </a:r>
             <a:r>
               <a:rPr lang="es-ES" dirty="0"/>
-              <a:t> son mucho más avanzadas</a:t>
-            </a:r>
-            <a:r>
-              <a:rPr lang="es-ES" dirty="0" smtClean="0"/>
-              <a:t>.</a:t>
+              <a:t> son mucho más avanzadas.</a:t>
             </a:r>
           </a:p>
           <a:p>
             <a:pPr marL="0" indent="0" algn="just">
               <a:buNone/>
             </a:pPr>
-            <a:endParaRPr lang="es-ES" dirty="0" smtClean="0"/>
+            <a:endParaRPr lang="es-ES" dirty="0"/>
           </a:p>
           <a:p>
             <a:pPr marL="0" indent="0" algn="just">
               <a:buNone/>
             </a:pPr>
-            <a:endParaRPr lang="es-ES" sz="1600" dirty="0" smtClean="0"/>
+            <a:endParaRPr lang="es-ES" sz="1600" dirty="0"/>
           </a:p>
           <a:p>
             <a:pPr lvl="1" algn="just">
@@ -5051,12 +5047,8 @@
               <a:buChar char="o"/>
             </a:pPr>
             <a:r>
-              <a:rPr lang="es-ES" sz="1400" dirty="0" smtClean="0"/>
-              <a:t>El </a:t>
-            </a:r>
-            <a:r>
               <a:rPr lang="es-ES" sz="1400" dirty="0"/>
-              <a:t>valor más sencillo de </a:t>
+              <a:t>El valor más sencillo de </a:t>
             </a:r>
             <a:r>
               <a:rPr lang="es-ES" sz="1400" dirty="0" err="1"/>
@@ -5076,15 +5068,7 @@
             </a:r>
             <a:r>
               <a:rPr lang="es-ES" sz="1400" dirty="0"/>
-              <a:t>que hace que el elemento no genere ninguna caja. </a:t>
-            </a:r>
-            <a:r>
-              <a:rPr lang="es-ES" sz="1400" dirty="0" smtClean="0"/>
-              <a:t>El </a:t>
-            </a:r>
-            <a:r>
-              <a:rPr lang="es-ES" sz="1400" dirty="0"/>
-              <a:t>resultado es que </a:t>
+              <a:t>que hace que el elemento no genere ninguna caja. El resultado es que </a:t>
             </a:r>
             <a:r>
               <a:rPr lang="es-ES" sz="1400" u="sng" dirty="0"/>
@@ -5108,15 +5092,7 @@
             </a:r>
             <a:r>
               <a:rPr lang="es-ES" sz="1400" dirty="0"/>
-              <a:t> sobre un elemento, todos sus descendientes también desaparecen por completo de la página</a:t>
-            </a:r>
-            <a:r>
-              <a:rPr lang="es-ES" sz="1400" dirty="0" smtClean="0"/>
-              <a:t>.</a:t>
-            </a:r>
-            <a:r>
-              <a:rPr lang="es-ES" sz="1400" dirty="0"/>
-              <a:t> La propiedad </a:t>
+              <a:t> sobre un elemento, todos sus descendientes también desaparecen por completo de la página. La propiedad </a:t>
             </a:r>
             <a:r>
               <a:rPr lang="es-ES" sz="1400" dirty="0" err="1"/>
@@ -5166,7 +5142,6 @@
               <a:rPr lang="es-ES" sz="1400" dirty="0"/>
               <a:t>. </a:t>
             </a:r>
-            <a:endParaRPr lang="es-ES" sz="1400" dirty="0" smtClean="0"/>
           </a:p>
           <a:p>
             <a:pPr marL="274320" lvl="1" indent="0" algn="just">
@@ -5180,12 +5155,8 @@
               <a:buChar char="o"/>
             </a:pPr>
             <a:r>
-              <a:rPr lang="es-ES" sz="1400" dirty="0" smtClean="0"/>
-              <a:t>Los </a:t>
-            </a:r>
-            <a:r>
               <a:rPr lang="es-ES" sz="1400" dirty="0"/>
-              <a:t>otros dos valores más utilizados son </a:t>
+              <a:t>Los otros dos valores más utilizados son </a:t>
             </a:r>
             <a:r>
               <a:rPr lang="es-ES" b="1" dirty="0"/>
@@ -5217,7 +5188,7 @@
             <a:pPr marL="0" indent="0">
               <a:buNone/>
             </a:pPr>
-            <a:endParaRPr lang="es-ES" sz="1600" dirty="0" smtClean="0"/>
+            <a:endParaRPr lang="es-ES" sz="1600" dirty="0"/>
           </a:p>
           <a:p>
             <a:pPr marL="0" indent="0">
@@ -5229,7 +5200,7 @@
             <a:pPr marL="0" indent="0">
               <a:buNone/>
             </a:pPr>
-            <a:endParaRPr lang="es-ES" sz="1600" dirty="0" smtClean="0"/>
+            <a:endParaRPr lang="es-ES" sz="1600" dirty="0"/>
           </a:p>
           <a:p>
             <a:pPr marL="0" indent="0">
@@ -5294,7 +5265,7 @@
             <a:pPr marL="0" indent="0">
               <a:buNone/>
             </a:pPr>
-            <a:endParaRPr lang="es-ES" sz="1600" dirty="0" smtClean="0"/>
+            <a:endParaRPr lang="es-ES" sz="1600" dirty="0"/>
           </a:p>
           <a:p>
             <a:pPr marL="0" indent="0">
@@ -5306,7 +5277,7 @@
             <a:pPr marL="0" indent="0">
               <a:buNone/>
             </a:pPr>
-            <a:endParaRPr lang="es-ES" sz="1600" dirty="0" smtClean="0"/>
+            <a:endParaRPr lang="es-ES" sz="1600" dirty="0"/>
           </a:p>
           <a:p>
             <a:pPr marL="0" indent="0">
@@ -5318,7 +5289,7 @@
             <a:pPr marL="0" indent="0">
               <a:buNone/>
             </a:pPr>
-            <a:endParaRPr lang="es-ES" sz="1600" dirty="0" smtClean="0"/>
+            <a:endParaRPr lang="es-ES" sz="1600" dirty="0"/>
           </a:p>
           <a:p>
             <a:pPr marL="0" indent="0">
@@ -5375,10 +5346,9 @@
           <a:lstStyle/>
           <a:p>
             <a:r>
-              <a:rPr lang="es-ES" sz="1600" dirty="0" smtClean="0"/>
+              <a:rPr lang="es-ES" sz="1600" dirty="0"/>
               <a:t>Abreviaturas:</a:t>
             </a:r>
-            <a:endParaRPr lang="es-ES" sz="1600" dirty="0"/>
           </a:p>
         </p:txBody>
       </p:sp>
@@ -5435,15 +5405,15 @@
           <a:lstStyle/>
           <a:p>
             <a:r>
-              <a:rPr lang="es-ES" dirty="0" smtClean="0"/>
+              <a:rPr lang="es-ES" dirty="0"/>
               <a:t>Z-</a:t>
             </a:r>
             <a:r>
-              <a:rPr lang="es-ES" dirty="0" err="1" smtClean="0"/>
+              <a:rPr lang="es-ES" dirty="0" err="1"/>
               <a:t>index</a:t>
             </a:r>
             <a:r>
-              <a:rPr lang="es-ES" dirty="0" smtClean="0"/>
+              <a:rPr lang="es-ES" dirty="0"/>
               <a:t>:</a:t>
             </a:r>
           </a:p>
@@ -5469,11 +5439,7 @@
             </a:r>
             <a:r>
               <a:rPr lang="es-ES" sz="1600" dirty="0"/>
-              <a:t> cubren aquellos con menor valor</a:t>
-            </a:r>
-            <a:r>
-              <a:rPr lang="es-ES" sz="1600" dirty="0" smtClean="0"/>
-              <a:t>.</a:t>
+              <a:t> cubren aquellos con menor valor.</a:t>
             </a:r>
           </a:p>
           <a:p>
@@ -5481,7 +5447,7 @@
               <a:buNone/>
             </a:pPr>
             <a:r>
-              <a:rPr lang="es-ES" sz="1600" dirty="0" smtClean="0"/>
+              <a:rPr lang="es-ES" sz="1600" dirty="0"/>
               <a:t>Ejemplo:</a:t>
             </a:r>
           </a:p>
@@ -5495,7 +5461,7 @@
             <a:pPr marL="0" indent="0">
               <a:buNone/>
             </a:pPr>
-            <a:endParaRPr lang="es-ES" sz="1600" dirty="0" smtClean="0"/>
+            <a:endParaRPr lang="es-ES" sz="1600" dirty="0"/>
           </a:p>
           <a:p>
             <a:pPr marL="0" indent="0">
@@ -5507,13 +5473,13 @@
             <a:pPr marL="0" indent="0">
               <a:buNone/>
             </a:pPr>
-            <a:endParaRPr lang="es-ES" sz="1600" dirty="0" smtClean="0"/>
+            <a:endParaRPr lang="es-ES" sz="1600" dirty="0"/>
           </a:p>
           <a:p>
             <a:pPr marL="0" indent="0">
               <a:buNone/>
             </a:pPr>
-            <a:endParaRPr lang="es-ES" sz="1600" dirty="0" smtClean="0"/>
+            <a:endParaRPr lang="es-ES" sz="1600" dirty="0"/>
           </a:p>
           <a:p>
             <a:pPr marL="0" indent="0">
@@ -5600,19 +5566,19 @@
           <a:lstStyle/>
           <a:p>
             <a:r>
-              <a:rPr lang="es-ES" dirty="0" err="1" smtClean="0"/>
+              <a:rPr lang="es-ES" dirty="0" err="1"/>
               <a:t>After</a:t>
             </a:r>
             <a:r>
-              <a:rPr lang="es-ES" dirty="0" smtClean="0"/>
+              <a:rPr lang="es-ES" dirty="0"/>
               <a:t> y </a:t>
             </a:r>
             <a:r>
-              <a:rPr lang="es-ES" dirty="0" err="1" smtClean="0"/>
+              <a:rPr lang="es-ES" dirty="0" err="1"/>
               <a:t>Before</a:t>
             </a:r>
             <a:r>
-              <a:rPr lang="es-ES" dirty="0" smtClean="0"/>
+              <a:rPr lang="es-ES" dirty="0"/>
               <a:t>:</a:t>
             </a:r>
           </a:p>
@@ -5656,19 +5622,14 @@
               <a:rPr lang="es-ES" sz="1600" dirty="0"/>
               <a:t>». </a:t>
             </a:r>
-            <a:endParaRPr lang="es-ES" sz="1600" dirty="0" smtClean="0"/>
           </a:p>
           <a:p>
             <a:pPr marL="0" indent="0">
               <a:buNone/>
             </a:pPr>
             <a:r>
-              <a:rPr lang="es-ES" sz="1600" dirty="0" smtClean="0"/>
-              <a:t>A </a:t>
-            </a:r>
-            <a:r>
               <a:rPr lang="es-ES" sz="1600" dirty="0"/>
-              <a:t>continuación, podemos asignar un contenido con la propiedad «</a:t>
+              <a:t>A continuación, podemos asignar un contenido con la propiedad «</a:t>
             </a:r>
             <a:r>
               <a:rPr lang="es-ES" sz="1600" dirty="0" err="1"/>
@@ -5678,7 +5639,6 @@
               <a:rPr lang="es-ES" sz="1600" dirty="0"/>
               <a:t>», de esta manera.</a:t>
             </a:r>
-            <a:endParaRPr lang="es-ES" sz="1600" dirty="0" smtClean="0"/>
           </a:p>
           <a:p>
             <a:pPr marL="0" indent="0">
@@ -5690,7 +5650,7 @@
             <a:pPr marL="0" indent="0">
               <a:buNone/>
             </a:pPr>
-            <a:endParaRPr lang="es-ES" sz="1600" dirty="0" smtClean="0"/>
+            <a:endParaRPr lang="es-ES" sz="1600" dirty="0"/>
           </a:p>
           <a:p>
             <a:pPr marL="0" indent="0">
@@ -5702,13 +5662,13 @@
             <a:pPr marL="0" indent="0">
               <a:buNone/>
             </a:pPr>
-            <a:endParaRPr lang="es-ES" sz="1600" dirty="0" smtClean="0"/>
+            <a:endParaRPr lang="es-ES" sz="1600" dirty="0"/>
           </a:p>
           <a:p>
             <a:pPr marL="0" indent="0">
               <a:buNone/>
             </a:pPr>
-            <a:endParaRPr lang="es-ES" sz="1600" dirty="0" smtClean="0"/>
+            <a:endParaRPr lang="es-ES" sz="1600" dirty="0"/>
           </a:p>
           <a:p>
             <a:pPr marL="0" indent="0">
@@ -5766,7 +5726,6 @@
               <a:rPr lang="es-ES" sz="1600" dirty="0"/>
               <a:t>-elemento que deseemos</a:t>
             </a:r>
-            <a:endParaRPr lang="es-ES" sz="1600" dirty="0"/>
           </a:p>
         </p:txBody>
       </p:sp>
@@ -5850,12 +5809,8 @@
               <a:buNone/>
             </a:pPr>
             <a:r>
-              <a:rPr lang="es-ES" sz="1600" dirty="0" smtClean="0"/>
-              <a:t>Se </a:t>
-            </a:r>
-            <a:r>
               <a:rPr lang="es-ES" sz="1600" dirty="0"/>
-              <a:t>llaman </a:t>
+              <a:t>Se llaman </a:t>
             </a:r>
             <a:r>
               <a:rPr lang="es-ES" sz="1600" dirty="0" err="1"/>
@@ -5889,19 +5844,14 @@
               <a:rPr lang="es-ES" sz="1600" dirty="0"/>
               <a:t>». </a:t>
             </a:r>
-            <a:endParaRPr lang="es-ES" sz="1600" dirty="0" smtClean="0"/>
           </a:p>
           <a:p>
             <a:pPr marL="0" indent="0">
               <a:buNone/>
             </a:pPr>
             <a:r>
-              <a:rPr lang="es-ES" sz="1600" dirty="0" smtClean="0"/>
-              <a:t>A </a:t>
-            </a:r>
-            <a:r>
               <a:rPr lang="es-ES" sz="1600" dirty="0"/>
-              <a:t>continuación, podemos asignar un contenido con la propiedad «</a:t>
+              <a:t>A continuación, podemos asignar un contenido con la propiedad «</a:t>
             </a:r>
             <a:r>
               <a:rPr lang="es-ES" sz="1600" dirty="0" err="1"/>
@@ -5909,18 +5859,14 @@
             </a:r>
             <a:r>
               <a:rPr lang="es-ES" sz="1600" dirty="0"/>
-              <a:t>», de esta manera</a:t>
-            </a:r>
-            <a:r>
-              <a:rPr lang="es-ES" sz="1600" dirty="0" smtClean="0"/>
-              <a:t>. Ejemplo:</a:t>
+              <a:t>», de esta manera. Ejemplo:</a:t>
             </a:r>
           </a:p>
           <a:p>
             <a:pPr marL="0" indent="0">
               <a:buNone/>
             </a:pPr>
-            <a:endParaRPr lang="es-ES" sz="1600" dirty="0" smtClean="0"/>
+            <a:endParaRPr lang="es-ES" sz="1600" dirty="0"/>
           </a:p>
         </p:txBody>
       </p:sp>
@@ -6007,7 +5953,6 @@
               <a:rPr lang="es-ES" sz="1600" dirty="0"/>
               <a:t>Obtendremos un resultado como el de la imagen:</a:t>
             </a:r>
-            <a:endParaRPr lang="es-ES" sz="1600" dirty="0" smtClean="0"/>
           </a:p>
         </p:txBody>
       </p:sp>
@@ -6086,10 +6031,9 @@
           <a:lstStyle/>
           <a:p>
             <a:r>
-              <a:rPr lang="es-ES" dirty="0" smtClean="0"/>
+              <a:rPr lang="es-ES" dirty="0"/>
               <a:t>Introducción</a:t>
             </a:r>
-            <a:endParaRPr lang="es-ES" dirty="0"/>
           </a:p>
         </p:txBody>
       </p:sp>
@@ -6115,12 +6059,8 @@
           <a:p>
             <a:pPr algn="just"/>
             <a:r>
-              <a:rPr lang="es-ES" dirty="0" smtClean="0"/>
-              <a:t>CSS es la tecnología </a:t>
-            </a:r>
-            <a:r>
               <a:rPr lang="es-ES" dirty="0"/>
-              <a:t>utilizada para dotar de </a:t>
+              <a:t>CSS es la tecnología utilizada para dotar de </a:t>
             </a:r>
             <a:r>
               <a:rPr lang="es-ES" b="1" dirty="0"/>
@@ -6128,11 +6068,7 @@
             </a:r>
             <a:r>
               <a:rPr lang="es-ES" dirty="0"/>
-              <a:t> a una página web</a:t>
-            </a:r>
-            <a:r>
-              <a:rPr lang="es-ES" dirty="0" smtClean="0"/>
-              <a:t>.</a:t>
+              <a:t> a una página web.</a:t>
             </a:r>
           </a:p>
           <a:p>
@@ -6165,7 +6101,6 @@
               <a:rPr lang="es-ES" dirty="0"/>
               <a:t>):</a:t>
             </a:r>
-            <a:endParaRPr lang="es-ES" dirty="0"/>
           </a:p>
         </p:txBody>
       </p:sp>
@@ -6246,11 +6181,11 @@
           <a:lstStyle/>
           <a:p>
             <a:r>
-              <a:rPr lang="es-ES" dirty="0" err="1" smtClean="0"/>
+              <a:rPr lang="es-ES" dirty="0" err="1"/>
               <a:t>Flexbox</a:t>
             </a:r>
             <a:r>
-              <a:rPr lang="es-ES" dirty="0" smtClean="0"/>
+              <a:rPr lang="es-ES" dirty="0"/>
               <a:t>:</a:t>
             </a:r>
           </a:p>
@@ -6260,15 +6195,7 @@
             </a:pPr>
             <a:r>
               <a:rPr lang="es-ES" sz="1600" dirty="0"/>
-              <a:t>S</a:t>
-            </a:r>
-            <a:r>
-              <a:rPr lang="es-ES" sz="1600" dirty="0" smtClean="0"/>
-              <a:t>e </a:t>
-            </a:r>
-            <a:r>
-              <a:rPr lang="es-ES" sz="1600" dirty="0"/>
-              <a:t>basa en un contenedor flexible (</a:t>
+              <a:t>Se basa en un contenedor flexible (</a:t>
             </a:r>
             <a:r>
               <a:rPr lang="es-ES" sz="1600" dirty="0" err="1"/>
@@ -6308,11 +6235,7 @@
             </a:r>
             <a:r>
               <a:rPr lang="es-ES" sz="1600" dirty="0"/>
-              <a:t> deben su flexibilidad al hecho de estar dentro del </a:t>
-            </a:r>
-            <a:r>
-              <a:rPr lang="es-ES" sz="1600" dirty="0" smtClean="0"/>
-              <a:t>contenedor</a:t>
+              <a:t> deben su flexibilidad al hecho de estar dentro del contenedor</a:t>
             </a:r>
           </a:p>
           <a:p>
@@ -6327,11 +6250,11 @@
               <a:buChar char="o"/>
             </a:pPr>
             <a:r>
-              <a:rPr lang="es-ES" sz="1600" b="1" dirty="0" err="1" smtClean="0"/>
+              <a:rPr lang="es-ES" sz="1600" b="1" dirty="0" err="1"/>
               <a:t>Display-flex</a:t>
             </a:r>
             <a:r>
-              <a:rPr lang="es-ES" sz="1600" b="1" dirty="0" smtClean="0"/>
+              <a:rPr lang="es-ES" sz="1600" b="1" dirty="0"/>
               <a:t>: </a:t>
             </a:r>
             <a:r>
@@ -6362,7 +6285,6 @@
               <a:rPr lang="es-ES" sz="1400" dirty="0"/>
               <a:t>". Esta propiedad hace que cambien las reglas con las cuales sus hijos van a ser representados en la página.</a:t>
             </a:r>
-            <a:endParaRPr lang="es-ES" sz="1400" dirty="0" smtClean="0"/>
           </a:p>
           <a:p>
             <a:pPr marL="0" indent="0">
@@ -6374,7 +6296,7 @@
             <a:pPr marL="0" indent="0">
               <a:buNone/>
             </a:pPr>
-            <a:endParaRPr lang="es-ES" sz="1600" dirty="0" smtClean="0"/>
+            <a:endParaRPr lang="es-ES" sz="1600" dirty="0"/>
           </a:p>
           <a:p>
             <a:pPr marL="0" indent="0">
@@ -6386,32 +6308,28 @@
             <a:pPr marL="0" indent="0">
               <a:buNone/>
             </a:pPr>
-            <a:endParaRPr lang="es-ES" sz="1600" dirty="0" smtClean="0"/>
-          </a:p>
-          <a:p>
-            <a:r>
-              <a:rPr lang="es-ES" sz="1600" b="1" dirty="0" err="1" smtClean="0"/>
+            <a:endParaRPr lang="es-ES" sz="1600" dirty="0"/>
+          </a:p>
+          <a:p>
+            <a:r>
+              <a:rPr lang="es-ES" sz="1600" b="1" dirty="0" err="1"/>
               <a:t>Display</a:t>
             </a:r>
             <a:r>
-              <a:rPr lang="es-ES" sz="1600" b="1" dirty="0" smtClean="0"/>
+              <a:rPr lang="es-ES" sz="1600" b="1" dirty="0"/>
               <a:t> </a:t>
             </a:r>
             <a:r>
-              <a:rPr lang="es-ES" sz="1600" b="1" dirty="0" err="1" smtClean="0"/>
+              <a:rPr lang="es-ES" sz="1600" b="1" dirty="0" err="1"/>
               <a:t>inline-flex</a:t>
             </a:r>
             <a:r>
-              <a:rPr lang="es-ES" sz="1600" b="1" dirty="0" smtClean="0"/>
+              <a:rPr lang="es-ES" sz="1600" b="1" dirty="0"/>
               <a:t>: </a:t>
             </a:r>
             <a:r>
-              <a:rPr lang="es-ES" sz="1400" dirty="0" smtClean="0"/>
-              <a:t>Además </a:t>
-            </a:r>
-            <a:r>
               <a:rPr lang="es-ES" sz="1400" dirty="0"/>
-              <a:t>del </a:t>
+              <a:t>Además del </a:t>
             </a:r>
             <a:r>
               <a:rPr lang="es-ES" sz="1400" dirty="0" err="1"/>
@@ -6451,11 +6369,7 @@
             </a:r>
             <a:r>
               <a:rPr lang="es-ES" sz="1400" dirty="0"/>
-              <a:t> para ocupar todo el espacio en la horizontal</a:t>
-            </a:r>
-            <a:r>
-              <a:rPr lang="es-ES" sz="1400" dirty="0" smtClean="0"/>
-              <a:t>.</a:t>
+              <a:t> para ocupar todo el espacio en la horizontal.</a:t>
             </a:r>
             <a:r>
               <a:rPr lang="es-ES" dirty="0"/>
@@ -6486,7 +6400,7 @@
               <a:t>Flexbox</a:t>
             </a:r>
             <a:r>
-              <a:rPr lang="es-ES" sz="1600" dirty="0" smtClean="0"/>
+              <a:rPr lang="es-ES" sz="1600" dirty="0"/>
               <a:t>.</a:t>
             </a:r>
           </a:p>
@@ -6494,10 +6408,10 @@
             <a:endParaRPr lang="es-ES" sz="1600" dirty="0"/>
           </a:p>
           <a:p>
-            <a:endParaRPr lang="es-ES" sz="1600" dirty="0" smtClean="0"/>
-          </a:p>
-          <a:p>
-            <a:endParaRPr lang="es-ES" sz="1600" dirty="0" smtClean="0"/>
+            <a:endParaRPr lang="es-ES" sz="1600" dirty="0"/>
+          </a:p>
+          <a:p>
+            <a:endParaRPr lang="es-ES" sz="1600" dirty="0"/>
           </a:p>
           <a:p>
             <a:endParaRPr lang="es-ES" sz="1600" dirty="0"/>
@@ -6634,15 +6548,15 @@
           <a:lstStyle/>
           <a:p>
             <a:r>
-              <a:rPr lang="es-ES" dirty="0" smtClean="0"/>
+              <a:rPr lang="es-ES" dirty="0"/>
               <a:t>Flex-</a:t>
             </a:r>
             <a:r>
-              <a:rPr lang="es-ES" dirty="0" err="1" smtClean="0"/>
+              <a:rPr lang="es-ES" dirty="0" err="1"/>
               <a:t>direction</a:t>
             </a:r>
             <a:r>
-              <a:rPr lang="es-ES" dirty="0" smtClean="0"/>
+              <a:rPr lang="es-ES" dirty="0"/>
               <a:t>:</a:t>
             </a:r>
           </a:p>
@@ -6652,18 +6566,14 @@
             </a:pPr>
             <a:r>
               <a:rPr lang="es-ES" sz="1600" dirty="0"/>
-              <a:t>Esta propiedad nos sirve para definir la dirección del flujo de colocación de los elementos</a:t>
-            </a:r>
-            <a:r>
-              <a:rPr lang="es-ES" sz="1600" dirty="0" smtClean="0"/>
-              <a:t>. Permite usar éstos elementos:</a:t>
+              <a:t>Esta propiedad nos sirve para definir la dirección del flujo de colocación de los elementos. Permite usar éstos elementos:</a:t>
             </a:r>
           </a:p>
           <a:p>
             <a:pPr marL="0" indent="0" algn="just">
               <a:buNone/>
             </a:pPr>
-            <a:endParaRPr lang="es-ES" sz="1600" dirty="0" smtClean="0"/>
+            <a:endParaRPr lang="es-ES" sz="1600" dirty="0"/>
           </a:p>
           <a:p>
             <a:pPr lvl="1">
@@ -6718,18 +6628,14 @@
             </a:r>
             <a:r>
               <a:rPr lang="es-ES" sz="1200" dirty="0"/>
-              <a:t>-reverse: se colocan en una columna, pero los primeros aparecerán abajo</a:t>
-            </a:r>
-            <a:r>
-              <a:rPr lang="es-ES" sz="1200" dirty="0" smtClean="0"/>
-              <a:t>.</a:t>
+              <a:t>-reverse: se colocan en una columna, pero los primeros aparecerán abajo.</a:t>
             </a:r>
           </a:p>
           <a:p>
             <a:pPr marL="274320" lvl="1" indent="0">
               <a:buNone/>
             </a:pPr>
-            <a:endParaRPr lang="es-ES" sz="1200" dirty="0" smtClean="0"/>
+            <a:endParaRPr lang="es-ES" sz="1200" dirty="0"/>
           </a:p>
           <a:p>
             <a:pPr marL="274320" lvl="1" indent="0">
@@ -6739,41 +6645,32 @@
           </a:p>
           <a:p>
             <a:r>
-              <a:rPr lang="es-ES" dirty="0" smtClean="0"/>
+              <a:rPr lang="es-ES" dirty="0"/>
               <a:t>Flex-</a:t>
             </a:r>
             <a:r>
-              <a:rPr lang="es-ES" dirty="0" err="1" smtClean="0"/>
+              <a:rPr lang="es-ES" dirty="0" err="1"/>
               <a:t>wrap</a:t>
             </a:r>
             <a:r>
-              <a:rPr lang="es-ES" sz="1800" dirty="0" smtClean="0"/>
+              <a:rPr lang="es-ES" sz="1800" dirty="0"/>
               <a:t>:</a:t>
             </a:r>
-            <a:endParaRPr lang="es-ES" sz="1800" dirty="0"/>
           </a:p>
           <a:p>
             <a:pPr marL="0" indent="0">
               <a:buNone/>
             </a:pPr>
             <a:r>
-              <a:rPr lang="es-ES" sz="1400" dirty="0" smtClean="0"/>
-              <a:t>Sirve </a:t>
-            </a:r>
-            <a:r>
               <a:rPr lang="es-ES" sz="1400" dirty="0"/>
-              <a:t>para indicar si queremos que haya saltos de línea en los elementos que se colocan en el contenedor, si es que éstos no caben en el espacio disponible</a:t>
-            </a:r>
-            <a:r>
-              <a:rPr lang="es-ES" sz="1400" dirty="0" smtClean="0"/>
-              <a:t>.</a:t>
+              <a:t>Sirve para indicar si queremos que haya saltos de línea en los elementos que se colocan en el contenedor, si es que éstos no caben en el espacio disponible.</a:t>
             </a:r>
           </a:p>
           <a:p>
             <a:pPr marL="0" indent="0">
               <a:buNone/>
             </a:pPr>
-            <a:endParaRPr lang="es-ES" sz="1400" dirty="0" smtClean="0"/>
+            <a:endParaRPr lang="es-ES" sz="1400" dirty="0"/>
           </a:p>
           <a:p>
             <a:pPr lvl="1">
@@ -6884,11 +6781,11 @@
           <a:lstStyle/>
           <a:p>
             <a:r>
-              <a:rPr lang="es-ES" dirty="0" err="1" smtClean="0"/>
+              <a:rPr lang="es-ES" dirty="0" err="1"/>
               <a:t>Justify-content</a:t>
             </a:r>
             <a:r>
-              <a:rPr lang="es-ES" dirty="0" smtClean="0"/>
+              <a:rPr lang="es-ES" dirty="0"/>
               <a:t>:</a:t>
             </a:r>
           </a:p>
@@ -6898,18 +6795,14 @@
             </a:pPr>
             <a:r>
               <a:rPr lang="es-ES" sz="1600" dirty="0"/>
-              <a:t>Esta propiedad es muy útil para indicar cómo se van a colocar los justificados y márgenes de los ítems. Puedes indicar que vayan a justificados al inicio del eje o al final del eje o que a la hora de distribuirse se coloque un espacio entre ellos o un espacio entre ellos y los </a:t>
-            </a:r>
-            <a:r>
-              <a:rPr lang="es-ES" sz="1600" dirty="0" smtClean="0"/>
-              <a:t>bordes. Posibles valores:</a:t>
+              <a:t>Esta propiedad es muy útil para indicar cómo se van a colocar los justificados y márgenes de los ítems. Puedes indicar que vayan a justificados al inicio del eje o al final del eje o que a la hora de distribuirse se coloque un espacio entre ellos o un espacio entre ellos y los bordes. Posibles valores:</a:t>
             </a:r>
           </a:p>
           <a:p>
             <a:pPr marL="0" indent="0" algn="just">
               <a:buNone/>
             </a:pPr>
-            <a:endParaRPr lang="es-ES" dirty="0" smtClean="0"/>
+            <a:endParaRPr lang="es-ES" dirty="0"/>
           </a:p>
           <a:p>
             <a:pPr lvl="1">
@@ -7082,11 +6975,11 @@
           <a:lstStyle/>
           <a:p>
             <a:r>
-              <a:rPr lang="es-ES" dirty="0" err="1" smtClean="0"/>
+              <a:rPr lang="es-ES" dirty="0" err="1"/>
               <a:t>Align-items</a:t>
             </a:r>
             <a:r>
-              <a:rPr lang="es-ES" dirty="0" smtClean="0"/>
+              <a:rPr lang="es-ES" dirty="0"/>
               <a:t>:</a:t>
             </a:r>
           </a:p>
@@ -7095,15 +6988,15 @@
               <a:buNone/>
             </a:pPr>
             <a:r>
-              <a:rPr lang="es-ES" sz="1600" dirty="0" smtClean="0"/>
+              <a:rPr lang="es-ES" sz="1600" dirty="0"/>
               <a:t>Esta propiedad es muy similar a la propiedad anterior, </a:t>
             </a:r>
             <a:r>
-              <a:rPr lang="es-ES" sz="1600" dirty="0" err="1" smtClean="0"/>
+              <a:rPr lang="es-ES" sz="1600" dirty="0" err="1"/>
               <a:t>justify-content</a:t>
             </a:r>
             <a:r>
-              <a:rPr lang="es-ES" sz="1600" dirty="0" smtClean="0"/>
+              <a:rPr lang="es-ES" sz="1600" dirty="0"/>
               <a:t>, solo que ahora estamos alineando con respecto al eje secundario y no el principal. </a:t>
             </a:r>
           </a:p>
@@ -7111,7 +7004,7 @@
             <a:pPr marL="0" indent="0">
               <a:buNone/>
             </a:pPr>
-            <a:endParaRPr lang="es-ES" sz="1600" dirty="0" smtClean="0"/>
+            <a:endParaRPr lang="es-ES" sz="1600" dirty="0"/>
           </a:p>
           <a:p>
             <a:pPr lvl="1">
@@ -7119,7 +7012,7 @@
               <a:buChar char="o"/>
             </a:pPr>
             <a:r>
-              <a:rPr lang="es-ES" sz="1400" dirty="0" err="1" smtClean="0"/>
+              <a:rPr lang="es-ES" sz="1400" dirty="0" err="1"/>
               <a:t>flex-start</a:t>
             </a:r>
             <a:r>
@@ -7183,7 +7076,7 @@
             <a:pPr marL="0" indent="0" algn="just">
               <a:buNone/>
             </a:pPr>
-            <a:endParaRPr lang="es-ES" sz="1200" dirty="0" smtClean="0"/>
+            <a:endParaRPr lang="es-ES" sz="1200" dirty="0"/>
           </a:p>
           <a:p>
             <a:pPr marL="0" indent="0">
@@ -7276,11 +7169,11 @@
           <a:lstStyle/>
           <a:p>
             <a:r>
-              <a:rPr lang="es-ES" dirty="0" err="1" smtClean="0"/>
+              <a:rPr lang="es-ES" dirty="0" err="1"/>
               <a:t>Align-content</a:t>
             </a:r>
             <a:r>
-              <a:rPr lang="es-ES" dirty="0" smtClean="0"/>
+              <a:rPr lang="es-ES" dirty="0"/>
               <a:t>:</a:t>
             </a:r>
           </a:p>
@@ -7298,18 +7191,14 @@
             </a:r>
             <a:r>
               <a:rPr lang="es-ES" sz="1600" dirty="0"/>
-              <a:t>. El efecto que conseguiremos será una alineación y separación de las filas en el eje secundario</a:t>
-            </a:r>
-            <a:r>
-              <a:rPr lang="es-ES" sz="1600" dirty="0" smtClean="0"/>
-              <a:t>. Valores:</a:t>
+              <a:t>. El efecto que conseguiremos será una alineación y separación de las filas en el eje secundario. Valores:</a:t>
             </a:r>
           </a:p>
           <a:p>
             <a:pPr marL="0" indent="0">
               <a:buNone/>
             </a:pPr>
-            <a:endParaRPr lang="es-ES" sz="1600" dirty="0" smtClean="0"/>
+            <a:endParaRPr lang="es-ES" sz="1600" dirty="0"/>
           </a:p>
           <a:p>
             <a:pPr lvl="1">
@@ -7403,7 +7292,7 @@
             <a:pPr marL="0" indent="0">
               <a:buNone/>
             </a:pPr>
-            <a:endParaRPr lang="es-ES" sz="1200" dirty="0" smtClean="0"/>
+            <a:endParaRPr lang="es-ES" sz="1200" dirty="0"/>
           </a:p>
           <a:p>
             <a:pPr marL="0" indent="0">
@@ -7518,11 +7407,11 @@
           <a:lstStyle/>
           <a:p>
             <a:r>
-              <a:rPr lang="es-ES" dirty="0" smtClean="0"/>
+              <a:rPr lang="es-ES" dirty="0"/>
               <a:t>Media </a:t>
             </a:r>
             <a:r>
-              <a:rPr lang="es-ES" dirty="0" err="1" smtClean="0"/>
+              <a:rPr lang="es-ES" dirty="0" err="1"/>
               <a:t>Queries</a:t>
             </a:r>
             <a:endParaRPr lang="es-ES" dirty="0"/>
@@ -7563,50 +7452,30 @@
             </a:r>
             <a:r>
               <a:rPr lang="es-ES" dirty="0"/>
-              <a:t> </a:t>
-            </a:r>
-            <a:r>
-              <a:rPr lang="es-ES" dirty="0" smtClean="0"/>
-              <a:t>son </a:t>
+              <a:t> son útiles cuando deseas modificar tu página web o aplicación en función del tipo de dispositivo o de características y parámetros específicos (como la resolución de la pantalla). Bootstrap4 es </a:t>
+            </a:r>
+            <a:r>
+              <a:rPr lang="es-ES" dirty="0" err="1"/>
+              <a:t>mobile</a:t>
             </a:r>
             <a:r>
               <a:rPr lang="es-ES" dirty="0"/>
-              <a:t>útiles cuando deseas modificar tu página web o aplicación en función del tipo de dispositivo </a:t>
-            </a:r>
-            <a:r>
-              <a:rPr lang="es-ES" dirty="0" smtClean="0"/>
-              <a:t>o </a:t>
+              <a:t> </a:t>
+            </a:r>
+            <a:r>
+              <a:rPr lang="es-ES" dirty="0" err="1"/>
+              <a:t>first</a:t>
             </a:r>
             <a:r>
               <a:rPr lang="es-ES" dirty="0"/>
-              <a:t>de características y parámetros específicos (como la resolución de la </a:t>
-            </a:r>
-            <a:r>
-              <a:rPr lang="es-ES" dirty="0" smtClean="0"/>
-              <a:t>pantalla). Bootstrap4 es </a:t>
-            </a:r>
-            <a:r>
-              <a:rPr lang="es-ES" dirty="0" err="1" smtClean="0"/>
-              <a:t>mobile</a:t>
-            </a:r>
-            <a:r>
-              <a:rPr lang="es-ES" dirty="0" smtClean="0"/>
-              <a:t> </a:t>
-            </a:r>
-            <a:r>
-              <a:rPr lang="es-ES" dirty="0" err="1" smtClean="0"/>
-              <a:t>first</a:t>
-            </a:r>
-            <a:r>
-              <a:rPr lang="es-ES" dirty="0" smtClean="0"/>
               <a:t>, maquetaremos de resoluciones mas pequeñas a mas grandes. Actualmente en web comercial utilizamos los cortes de Bootstrap4:</a:t>
             </a:r>
           </a:p>
           <a:p>
-            <a:endParaRPr lang="es-ES" dirty="0" smtClean="0"/>
-          </a:p>
-          <a:p>
-            <a:endParaRPr lang="es-ES" dirty="0" smtClean="0"/>
+            <a:endParaRPr lang="es-ES" dirty="0"/>
+          </a:p>
+          <a:p>
+            <a:endParaRPr lang="es-ES" dirty="0"/>
           </a:p>
           <a:p>
             <a:pPr marL="2017120" lvl="7" indent="0">
@@ -7623,14 +7492,10 @@
             </a:pPr>
             <a:r>
               <a:rPr lang="es-ES" dirty="0"/>
-              <a:t>Pantallas pequeñas </a:t>
-            </a:r>
-            <a:r>
-              <a:rPr lang="es-ES" dirty="0" smtClean="0"/>
-              <a:t>(</a:t>
-            </a:r>
-            <a:r>
-              <a:rPr lang="es-ES" dirty="0" err="1" smtClean="0"/>
+              <a:t>Pantallas pequeñas (</a:t>
+            </a:r>
+            <a:r>
+              <a:rPr lang="es-ES" dirty="0" err="1"/>
               <a:t>sm</a:t>
             </a:r>
             <a:r>
@@ -7643,15 +7508,7 @@
             </a:r>
             <a:r>
               <a:rPr lang="es-ES" dirty="0"/>
-              <a:t> </a:t>
-            </a:r>
-            <a:r>
-              <a:rPr lang="es-ES" dirty="0" smtClean="0"/>
-              <a:t>en </a:t>
-            </a:r>
-            <a:r>
-              <a:rPr lang="es-ES" dirty="0"/>
-              <a:t>vertical) ≥ 576px</a:t>
+              <a:t> en vertical) ≥ 576px</a:t>
             </a:r>
           </a:p>
           <a:p>
@@ -7752,20 +7609,20 @@
           <a:lstStyle/>
           <a:p>
             <a:r>
-              <a:rPr lang="es-ES" dirty="0" smtClean="0"/>
+              <a:rPr lang="es-ES" dirty="0"/>
               <a:t>Ejemplo de </a:t>
             </a:r>
             <a:r>
-              <a:rPr lang="es-ES" dirty="0" err="1" smtClean="0"/>
+              <a:rPr lang="es-ES" dirty="0" err="1"/>
               <a:t>css</a:t>
             </a:r>
             <a:r>
-              <a:rPr lang="es-ES" dirty="0" smtClean="0"/>
+              <a:rPr lang="es-ES" dirty="0"/>
               <a:t>:</a:t>
             </a:r>
           </a:p>
           <a:p>
-            <a:endParaRPr lang="es-ES" dirty="0" smtClean="0"/>
+            <a:endParaRPr lang="es-ES" dirty="0"/>
           </a:p>
           <a:p>
             <a:pPr marL="2317120" lvl="8" indent="0">
@@ -7804,10 +7661,9 @@
               <a:buNone/>
             </a:pPr>
             <a:r>
-              <a:rPr lang="es-ES" sz="1200" dirty="0" smtClean="0"/>
+              <a:rPr lang="es-ES" sz="1200" dirty="0"/>
               <a:t>}</a:t>
             </a:r>
-            <a:endParaRPr lang="es-ES" sz="1200" dirty="0"/>
           </a:p>
           <a:p>
             <a:pPr marL="2317120" lvl="8" indent="0">
@@ -7837,10 +7693,9 @@
               <a:buNone/>
             </a:pPr>
             <a:r>
-              <a:rPr lang="es-ES" sz="1200" dirty="0" smtClean="0"/>
+              <a:rPr lang="es-ES" sz="1200" dirty="0"/>
               <a:t>}</a:t>
             </a:r>
-            <a:endParaRPr lang="es-ES" sz="1200" dirty="0"/>
           </a:p>
           <a:p>
             <a:pPr marL="2317120" lvl="8" indent="0">
@@ -7870,10 +7725,9 @@
               <a:buNone/>
             </a:pPr>
             <a:r>
-              <a:rPr lang="es-ES" sz="1200" dirty="0" smtClean="0"/>
+              <a:rPr lang="es-ES" sz="1200" dirty="0"/>
               <a:t>}</a:t>
             </a:r>
-            <a:endParaRPr lang="es-ES" sz="1200" dirty="0"/>
           </a:p>
           <a:p>
             <a:pPr marL="2317120" lvl="8" indent="0">
@@ -7903,10 +7757,9 @@
               <a:buNone/>
             </a:pPr>
             <a:r>
-              <a:rPr lang="es-ES" sz="1200" dirty="0" smtClean="0"/>
+              <a:rPr lang="es-ES" sz="1200" dirty="0"/>
               <a:t>}</a:t>
             </a:r>
-            <a:endParaRPr lang="es-ES" sz="1200" dirty="0"/>
           </a:p>
           <a:p>
             <a:pPr marL="2317120" lvl="8" indent="0">
@@ -7936,10 +7789,9 @@
               <a:buNone/>
             </a:pPr>
             <a:r>
-              <a:rPr lang="es-ES" sz="1200" dirty="0" smtClean="0"/>
+              <a:rPr lang="es-ES" sz="1200" dirty="0"/>
               <a:t>}</a:t>
             </a:r>
-            <a:endParaRPr lang="es-ES" sz="1200" dirty="0"/>
           </a:p>
         </p:txBody>
       </p:sp>
@@ -7994,18 +7846,17 @@
           <a:lstStyle/>
           <a:p>
             <a:r>
-              <a:rPr lang="es-ES" dirty="0" smtClean="0"/>
+              <a:rPr lang="es-ES" dirty="0"/>
               <a:t>Propiedades </a:t>
             </a:r>
             <a:r>
-              <a:rPr lang="es-ES" dirty="0" err="1" smtClean="0"/>
+              <a:rPr lang="es-ES" dirty="0" err="1"/>
               <a:t>css</a:t>
             </a:r>
             <a:r>
-              <a:rPr lang="es-ES" dirty="0" smtClean="0"/>
+              <a:rPr lang="es-ES" dirty="0"/>
               <a:t> más usadas</a:t>
             </a:r>
-            <a:endParaRPr lang="es-ES" dirty="0"/>
           </a:p>
         </p:txBody>
       </p:sp>
@@ -8030,20 +7881,19 @@
           <a:lstStyle/>
           <a:p>
             <a:r>
-              <a:rPr lang="es-ES" dirty="0" err="1" smtClean="0"/>
+              <a:rPr lang="es-ES" dirty="0" err="1"/>
               <a:t>Background</a:t>
             </a:r>
-            <a:endParaRPr lang="es-ES" dirty="0" smtClean="0"/>
+            <a:endParaRPr lang="es-ES" dirty="0"/>
           </a:p>
           <a:p>
             <a:pPr marL="0" indent="0">
               <a:buNone/>
             </a:pPr>
             <a:r>
-              <a:rPr lang="es-ES" dirty="0" smtClean="0"/>
+              <a:rPr lang="es-ES" dirty="0"/>
               <a:t>Tenemos una serie de propiedades para aplicar fondos</a:t>
             </a:r>
-            <a:endParaRPr lang="es-ES" dirty="0"/>
           </a:p>
         </p:txBody>
       </p:sp>
@@ -8179,7 +8029,7 @@
           <a:lstStyle/>
           <a:p>
             <a:r>
-              <a:rPr lang="es-ES" dirty="0" smtClean="0"/>
+              <a:rPr lang="es-ES" dirty="0"/>
               <a:t>Sombras:</a:t>
             </a:r>
           </a:p>
@@ -8188,10 +8038,9 @@
               <a:buNone/>
             </a:pPr>
             <a:r>
-              <a:rPr lang="es-ES" dirty="0" smtClean="0"/>
+              <a:rPr lang="es-ES" dirty="0"/>
               <a:t>Contamos con sombras para aplicar rápidamente sin esfuerzos</a:t>
             </a:r>
-            <a:endParaRPr lang="es-ES" dirty="0"/>
           </a:p>
         </p:txBody>
       </p:sp>
@@ -8327,7 +8176,7 @@
           <a:lstStyle/>
           <a:p>
             <a:r>
-              <a:rPr lang="es-ES" dirty="0" smtClean="0"/>
+              <a:rPr lang="es-ES" dirty="0"/>
               <a:t>Mostrar/ocultar elementos:</a:t>
             </a:r>
           </a:p>
@@ -8335,21 +8184,21 @@
             <a:endParaRPr lang="es-ES" dirty="0"/>
           </a:p>
           <a:p>
-            <a:endParaRPr lang="es-ES" dirty="0" smtClean="0"/>
-          </a:p>
-          <a:p>
             <a:endParaRPr lang="es-ES" dirty="0"/>
           </a:p>
           <a:p>
-            <a:endParaRPr lang="es-ES" dirty="0" smtClean="0"/>
-          </a:p>
-          <a:p>
-            <a:r>
-              <a:rPr lang="es-ES" dirty="0" err="1" smtClean="0"/>
+            <a:endParaRPr lang="es-ES" dirty="0"/>
+          </a:p>
+          <a:p>
+            <a:endParaRPr lang="es-ES" dirty="0"/>
+          </a:p>
+          <a:p>
+            <a:r>
+              <a:rPr lang="es-ES" dirty="0" err="1"/>
               <a:t>Border</a:t>
             </a:r>
             <a:r>
-              <a:rPr lang="es-ES" dirty="0" smtClean="0"/>
+              <a:rPr lang="es-ES" dirty="0"/>
               <a:t>:</a:t>
             </a:r>
           </a:p>
@@ -8358,7 +8207,7 @@
               <a:buNone/>
             </a:pPr>
             <a:r>
-              <a:rPr lang="es-ES" dirty="0" smtClean="0"/>
+              <a:rPr lang="es-ES" dirty="0"/>
               <a:t>Podemos aplicar los bordes que queramos (todos, superior, inferior, izquierda, derecha…)</a:t>
             </a:r>
           </a:p>
@@ -8466,7 +8315,7 @@
               <a:buNone/>
             </a:pPr>
             <a:r>
-              <a:rPr lang="es-ES" dirty="0" smtClean="0"/>
+              <a:rPr lang="es-ES" dirty="0"/>
               <a:t>Bordes de colores:</a:t>
             </a:r>
           </a:p>
@@ -8556,7 +8405,7 @@
               <a:buNone/>
             </a:pPr>
             <a:r>
-              <a:rPr lang="es-ES" dirty="0" smtClean="0"/>
+              <a:rPr lang="es-ES" dirty="0"/>
               <a:t>Bordes redondeados:</a:t>
             </a:r>
           </a:p>

</xml_diff>